<commit_message>
added course stage 3
</commit_message>
<xml_diff>
--- a/1. Preparación del entorno/1. Preparación del Entorno.pptx
+++ b/1. Preparación del entorno/1. Preparación del Entorno.pptx
@@ -289,7 +289,7 @@
           <a:p>
             <a:fld id="{9DA3D7FE-CDC8-4763-B0C2-7F2E10BA6EE1}" type="datetimeFigureOut">
               <a:rPr lang="ca-ES" smtClean="0"/>
-              <a:t>28/9/2020</a:t>
+              <a:t>29/9/2020</a:t>
             </a:fld>
             <a:endParaRPr lang="ca-ES"/>
           </a:p>
@@ -467,7 +467,7 @@
           <a:p>
             <a:fld id="{66F9DEA0-BD61-4A4C-AAFB-420A3EF0FDAC}" type="datetimeFigureOut">
               <a:rPr lang="ca-ES" smtClean="0"/>
-              <a:t>28/9/2020</a:t>
+              <a:t>29/9/2020</a:t>
             </a:fld>
             <a:endParaRPr lang="ca-ES"/>
           </a:p>
@@ -7425,14 +7425,10 @@
             </a:pPr>
             <a:r>
               <a:rPr lang="es-ES" dirty="0"/>
-              <a:t>4+ años trabajando con Docker containers</a:t>
-            </a:r>
-          </a:p>
-          <a:p>
-            <a:pPr marL="285750" indent="-285750">
-              <a:buFontTx/>
-              <a:buChar char="-"/>
-            </a:pPr>
+              <a:t>5+ años trabajando con AWS</a:t>
+            </a:r>
+          </a:p>
+          <a:p>
             <a:endParaRPr lang="es-ES" dirty="0"/>
           </a:p>
           <a:p>
@@ -10542,7 +10538,7 @@
             </a:pPr>
             <a:r>
               <a:rPr lang="es-ES" dirty="0"/>
-              <a:t>Developers que trabajen con entornos de producción y desarrollo</a:t>
+              <a:t>Developers y profesionales que trabajen con entornos de producción y desarrollo</a:t>
             </a:r>
           </a:p>
         </p:txBody>
@@ -12438,7 +12434,7 @@
         </p:spPr>
         <p:txBody>
           <a:bodyPr>
-            <a:normAutofit/>
+            <a:normAutofit fontScale="92500" lnSpcReduction="10000"/>
           </a:bodyPr>
           <a:lstStyle/>
           <a:p>
@@ -12508,6 +12504,29 @@
               <a:rPr lang="es-ES" i="1" dirty="0"/>
               <a:t> install git</a:t>
             </a:r>
+          </a:p>
+          <a:p>
+            <a:endParaRPr lang="es-ES" i="1" dirty="0"/>
+          </a:p>
+          <a:p>
+            <a:r>
+              <a:rPr lang="es-ES" sz="1300" dirty="0"/>
+              <a:t>PD: si nos aparece un error de </a:t>
+            </a:r>
+            <a:r>
+              <a:rPr lang="es-ES" sz="1300" dirty="0" err="1"/>
+              <a:t>SSl</a:t>
+            </a:r>
+            <a:r>
+              <a:rPr lang="es-ES" sz="1300" dirty="0"/>
+              <a:t>, deberemos configurar el proxy en nuestra consola con: </a:t>
+            </a:r>
+          </a:p>
+          <a:p>
+            <a:endParaRPr lang="es-ES" sz="1300" i="1" dirty="0"/>
+          </a:p>
+          <a:p>
+            <a:endParaRPr lang="es-ES" i="1" dirty="0"/>
           </a:p>
         </p:txBody>
       </p:sp>
@@ -14129,15 +14148,6 @@
 </file>
 
 <file path=customXml/item2.xml><?xml version="1.0" encoding="utf-8"?>
-<?mso-contentType ?>
-<FormTemplates xmlns="http://schemas.microsoft.com/sharepoint/v3/contenttype/forms">
-  <Display>DocumentLibraryForm</Display>
-  <Edit>DocumentLibraryForm</Edit>
-  <New>DocumentLibraryForm</New>
-</FormTemplates>
-</file>
-
-<file path=customXml/item3.xml><?xml version="1.0" encoding="utf-8"?>
 <ct:contentTypeSchema xmlns:ct="http://schemas.microsoft.com/office/2006/metadata/contentType" xmlns:ma="http://schemas.microsoft.com/office/2006/metadata/properties/metaAttributes" ct:_="" ma:_="" ma:contentTypeName="Document" ma:contentTypeID="0x010100043477CBD4C6CB4FBD379D4D02B2C9F1" ma:contentTypeVersion="7" ma:contentTypeDescription="Create a new document." ma:contentTypeScope="" ma:versionID="e52b0fca996f618b745ce64851f614fd">
   <xsd:schema xmlns:xsd="http://www.w3.org/2001/XMLSchema" xmlns:xs="http://www.w3.org/2001/XMLSchema" xmlns:p="http://schemas.microsoft.com/office/2006/metadata/properties" xmlns:ns2="9e9454b4-51c0-45d6-b250-bdd7e509af23" targetNamespace="http://schemas.microsoft.com/office/2006/metadata/properties" ma:root="true" ma:fieldsID="1cad610c496d18b47ad4f62e20e81023" ns2:_="">
     <xsd:import namespace="9e9454b4-51c0-45d6-b250-bdd7e509af23"/>
@@ -14301,6 +14311,15 @@
 </ct:contentTypeSchema>
 </file>
 
+<file path=customXml/item3.xml><?xml version="1.0" encoding="utf-8"?>
+<?mso-contentType ?>
+<FormTemplates xmlns="http://schemas.microsoft.com/sharepoint/v3/contenttype/forms">
+  <Display>DocumentLibraryForm</Display>
+  <Edit>DocumentLibraryForm</Edit>
+  <New>DocumentLibraryForm</New>
+</FormTemplates>
+</file>
+
 <file path=customXml/itemProps1.xml><?xml version="1.0" encoding="utf-8"?>
 <ds:datastoreItem xmlns:ds="http://schemas.openxmlformats.org/officeDocument/2006/customXml" ds:itemID="{BA93BAE8-E461-49ED-9079-5EF91E7376F8}">
   <ds:schemaRefs>
@@ -14318,14 +14337,6 @@
 </file>
 
 <file path=customXml/itemProps2.xml><?xml version="1.0" encoding="utf-8"?>
-<ds:datastoreItem xmlns:ds="http://schemas.openxmlformats.org/officeDocument/2006/customXml" ds:itemID="{B4C38641-5F87-452D-A890-F9D31ECD2433}">
-  <ds:schemaRefs>
-    <ds:schemaRef ds:uri="http://schemas.microsoft.com/sharepoint/v3/contenttype/forms"/>
-  </ds:schemaRefs>
-</ds:datastoreItem>
-</file>
-
-<file path=customXml/itemProps3.xml><?xml version="1.0" encoding="utf-8"?>
 <ds:datastoreItem xmlns:ds="http://schemas.openxmlformats.org/officeDocument/2006/customXml" ds:itemID="{5EB15170-D293-4829-A2DE-DAE27A7AEA7C}">
   <ds:schemaRefs>
     <ds:schemaRef ds:uri="http://schemas.microsoft.com/office/2006/metadata/contentType"/>
@@ -14341,4 +14352,12 @@
     <ds:schemaRef ds:uri="http://schemas.microsoft.com/internal/obd"/>
   </ds:schemaRefs>
 </ds:datastoreItem>
+</file>
+
+<file path=customXml/itemProps3.xml><?xml version="1.0" encoding="utf-8"?>
+<ds:datastoreItem xmlns:ds="http://schemas.openxmlformats.org/officeDocument/2006/customXml" ds:itemID="{B4C38641-5F87-452D-A890-F9D31ECD2433}">
+  <ds:schemaRefs>
+    <ds:schemaRef ds:uri="http://schemas.microsoft.com/sharepoint/v3/contenttype/forms"/>
+  </ds:schemaRefs>
+</ds:datastoreItem>
 </file>
</xml_diff>